<commit_message>
Changed title of project
</commit_message>
<xml_diff>
--- a/presentation/A Simple Self Drive Model.pptx
+++ b/presentation/A Simple Self Drive Model.pptx
@@ -343,7 +343,7 @@
           <a:p>
             <a:fld id="{EC494720-AE00-41D5-933F-A0A312317A1D}" type="datetimeFigureOut">
               <a:rPr lang="en-US" smtClean="0"/>
-              <a:t>1/23/2025</a:t>
+              <a:t>1/24/2025</a:t>
             </a:fld>
             <a:endParaRPr lang="en-US"/>
           </a:p>
@@ -38989,13 +38989,18 @@
           <a:lstStyle/>
           <a:p>
             <a:r>
-              <a:rPr lang="en-US" dirty="0">
+              <a:rPr lang="en-US">
                 <a:solidFill>
                   <a:srgbClr val="000000"/>
                 </a:solidFill>
               </a:rPr>
-              <a:t>A Simple Self Drive Model</a:t>
+              <a:t>VisionDrive</a:t>
             </a:r>
+            <a:endParaRPr lang="en-US" dirty="0">
+              <a:solidFill>
+                <a:srgbClr val="000000"/>
+              </a:solidFill>
+            </a:endParaRPr>
           </a:p>
         </p:txBody>
       </p:sp>

</xml_diff>